<commit_message>
Update window layout for scrollbars on canvas
</commit_message>
<xml_diff>
--- a/PythonVisualizations/design/WindowLayout.pptx
+++ b/PythonVisualizations/design/WindowLayout.pptx
@@ -104,6 +104,22 @@
       </a:defRPr>
     </a:lvl9pPr>
   </p:defaultTextStyle>
+  <p:extLst>
+    <p:ext uri="{EFAFB233-063F-42B5-8137-9DF3F51BA10A}">
+      <p15:sldGuideLst xmlns:p15="http://schemas.microsoft.com/office/powerpoint/2012/main">
+        <p15:guide id="1" orient="horz" pos="2160">
+          <p15:clr>
+            <a:srgbClr val="A4A3A4"/>
+          </p15:clr>
+        </p15:guide>
+        <p15:guide id="2" pos="2880">
+          <p15:clr>
+            <a:srgbClr val="A4A3A4"/>
+          </p15:clr>
+        </p15:guide>
+      </p15:sldGuideLst>
+    </p:ext>
+  </p:extLst>
 </p:presentation>
 </file>
 
@@ -145,10 +161,9 @@
           <a:lstStyle/>
           <a:p>
             <a:r>
-              <a:rPr lang="en-US" smtClean="0"/>
+              <a:rPr lang="en-US"/>
               <a:t>Click to edit Master title style</a:t>
             </a:r>
-            <a:endParaRPr lang="en-US"/>
           </a:p>
         </p:txBody>
       </p:sp>
@@ -264,10 +279,9 @@
           </a:lstStyle>
           <a:p>
             <a:r>
-              <a:rPr lang="en-US" smtClean="0"/>
+              <a:rPr lang="en-US"/>
               <a:t>Click to edit Master subtitle style</a:t>
             </a:r>
-            <a:endParaRPr lang="en-US"/>
           </a:p>
         </p:txBody>
       </p:sp>
@@ -288,7 +302,7 @@
           <a:p>
             <a:fld id="{B01F9CA3-105E-4857-9057-6DB6197DA786}" type="datetimeFigureOut">
               <a:rPr lang="en-US" smtClean="0"/>
-              <a:t>7/31/20</a:t>
+              <a:t>3/15/21</a:t>
             </a:fld>
             <a:endParaRPr lang="en-US"/>
           </a:p>
@@ -382,10 +396,9 @@
           <a:lstStyle/>
           <a:p>
             <a:r>
-              <a:rPr lang="en-US" smtClean="0"/>
+              <a:rPr lang="en-US"/>
               <a:t>Click to edit Master title style</a:t>
             </a:r>
-            <a:endParaRPr lang="en-US"/>
           </a:p>
         </p:txBody>
       </p:sp>
@@ -406,38 +419,37 @@
           <a:p>
             <a:pPr lvl="0"/>
             <a:r>
-              <a:rPr lang="en-US" smtClean="0"/>
+              <a:rPr lang="en-US"/>
               <a:t>Click to edit Master text styles</a:t>
             </a:r>
           </a:p>
           <a:p>
             <a:pPr lvl="1"/>
             <a:r>
-              <a:rPr lang="en-US" smtClean="0"/>
+              <a:rPr lang="en-US"/>
               <a:t>Second level</a:t>
             </a:r>
           </a:p>
           <a:p>
             <a:pPr lvl="2"/>
             <a:r>
-              <a:rPr lang="en-US" smtClean="0"/>
+              <a:rPr lang="en-US"/>
               <a:t>Third level</a:t>
             </a:r>
           </a:p>
           <a:p>
             <a:pPr lvl="3"/>
             <a:r>
-              <a:rPr lang="en-US" smtClean="0"/>
+              <a:rPr lang="en-US"/>
               <a:t>Fourth level</a:t>
             </a:r>
           </a:p>
           <a:p>
             <a:pPr lvl="4"/>
             <a:r>
-              <a:rPr lang="en-US" smtClean="0"/>
+              <a:rPr lang="en-US"/>
               <a:t>Fifth level</a:t>
             </a:r>
-            <a:endParaRPr lang="en-US"/>
           </a:p>
         </p:txBody>
       </p:sp>
@@ -458,7 +470,7 @@
           <a:p>
             <a:fld id="{B01F9CA3-105E-4857-9057-6DB6197DA786}" type="datetimeFigureOut">
               <a:rPr lang="en-US" smtClean="0"/>
-              <a:t>7/31/20</a:t>
+              <a:t>3/15/21</a:t>
             </a:fld>
             <a:endParaRPr lang="en-US"/>
           </a:p>
@@ -557,10 +569,9 @@
           <a:lstStyle/>
           <a:p>
             <a:r>
-              <a:rPr lang="en-US" smtClean="0"/>
+              <a:rPr lang="en-US"/>
               <a:t>Click to edit Master title style</a:t>
             </a:r>
-            <a:endParaRPr lang="en-US"/>
           </a:p>
         </p:txBody>
       </p:sp>
@@ -586,38 +597,37 @@
           <a:p>
             <a:pPr lvl="0"/>
             <a:r>
-              <a:rPr lang="en-US" smtClean="0"/>
+              <a:rPr lang="en-US"/>
               <a:t>Click to edit Master text styles</a:t>
             </a:r>
           </a:p>
           <a:p>
             <a:pPr lvl="1"/>
             <a:r>
-              <a:rPr lang="en-US" smtClean="0"/>
+              <a:rPr lang="en-US"/>
               <a:t>Second level</a:t>
             </a:r>
           </a:p>
           <a:p>
             <a:pPr lvl="2"/>
             <a:r>
-              <a:rPr lang="en-US" smtClean="0"/>
+              <a:rPr lang="en-US"/>
               <a:t>Third level</a:t>
             </a:r>
           </a:p>
           <a:p>
             <a:pPr lvl="3"/>
             <a:r>
-              <a:rPr lang="en-US" smtClean="0"/>
+              <a:rPr lang="en-US"/>
               <a:t>Fourth level</a:t>
             </a:r>
           </a:p>
           <a:p>
             <a:pPr lvl="4"/>
             <a:r>
-              <a:rPr lang="en-US" smtClean="0"/>
+              <a:rPr lang="en-US"/>
               <a:t>Fifth level</a:t>
             </a:r>
-            <a:endParaRPr lang="en-US"/>
           </a:p>
         </p:txBody>
       </p:sp>
@@ -638,7 +648,7 @@
           <a:p>
             <a:fld id="{B01F9CA3-105E-4857-9057-6DB6197DA786}" type="datetimeFigureOut">
               <a:rPr lang="en-US" smtClean="0"/>
-              <a:t>7/31/20</a:t>
+              <a:t>3/15/21</a:t>
             </a:fld>
             <a:endParaRPr lang="en-US"/>
           </a:p>
@@ -732,10 +742,9 @@
           <a:lstStyle/>
           <a:p>
             <a:r>
-              <a:rPr lang="en-US" smtClean="0"/>
+              <a:rPr lang="en-US"/>
               <a:t>Click to edit Master title style</a:t>
             </a:r>
-            <a:endParaRPr lang="en-US"/>
           </a:p>
         </p:txBody>
       </p:sp>
@@ -756,38 +765,37 @@
           <a:p>
             <a:pPr lvl="0"/>
             <a:r>
-              <a:rPr lang="en-US" smtClean="0"/>
+              <a:rPr lang="en-US"/>
               <a:t>Click to edit Master text styles</a:t>
             </a:r>
           </a:p>
           <a:p>
             <a:pPr lvl="1"/>
             <a:r>
-              <a:rPr lang="en-US" smtClean="0"/>
+              <a:rPr lang="en-US"/>
               <a:t>Second level</a:t>
             </a:r>
           </a:p>
           <a:p>
             <a:pPr lvl="2"/>
             <a:r>
-              <a:rPr lang="en-US" smtClean="0"/>
+              <a:rPr lang="en-US"/>
               <a:t>Third level</a:t>
             </a:r>
           </a:p>
           <a:p>
             <a:pPr lvl="3"/>
             <a:r>
-              <a:rPr lang="en-US" smtClean="0"/>
+              <a:rPr lang="en-US"/>
               <a:t>Fourth level</a:t>
             </a:r>
           </a:p>
           <a:p>
             <a:pPr lvl="4"/>
             <a:r>
-              <a:rPr lang="en-US" smtClean="0"/>
+              <a:rPr lang="en-US"/>
               <a:t>Fifth level</a:t>
             </a:r>
-            <a:endParaRPr lang="en-US"/>
           </a:p>
         </p:txBody>
       </p:sp>
@@ -808,7 +816,7 @@
           <a:p>
             <a:fld id="{B01F9CA3-105E-4857-9057-6DB6197DA786}" type="datetimeFigureOut">
               <a:rPr lang="en-US" smtClean="0"/>
-              <a:t>7/31/20</a:t>
+              <a:t>3/15/21</a:t>
             </a:fld>
             <a:endParaRPr lang="en-US"/>
           </a:p>
@@ -911,10 +919,9 @@
           </a:lstStyle>
           <a:p>
             <a:r>
-              <a:rPr lang="en-US" smtClean="0"/>
+              <a:rPr lang="en-US"/>
               <a:t>Click to edit Master title style</a:t>
             </a:r>
-            <a:endParaRPr lang="en-US"/>
           </a:p>
         </p:txBody>
       </p:sp>
@@ -1031,7 +1038,7 @@
           <a:p>
             <a:pPr lvl="0"/>
             <a:r>
-              <a:rPr lang="en-US" smtClean="0"/>
+              <a:rPr lang="en-US"/>
               <a:t>Click to edit Master text styles</a:t>
             </a:r>
           </a:p>
@@ -1054,7 +1061,7 @@
           <a:p>
             <a:fld id="{B01F9CA3-105E-4857-9057-6DB6197DA786}" type="datetimeFigureOut">
               <a:rPr lang="en-US" smtClean="0"/>
-              <a:t>7/31/20</a:t>
+              <a:t>3/15/21</a:t>
             </a:fld>
             <a:endParaRPr lang="en-US"/>
           </a:p>
@@ -1148,10 +1155,9 @@
           <a:lstStyle/>
           <a:p>
             <a:r>
-              <a:rPr lang="en-US" smtClean="0"/>
+              <a:rPr lang="en-US"/>
               <a:t>Click to edit Master title style</a:t>
             </a:r>
-            <a:endParaRPr lang="en-US"/>
           </a:p>
         </p:txBody>
       </p:sp>
@@ -1205,38 +1211,37 @@
           <a:p>
             <a:pPr lvl="0"/>
             <a:r>
-              <a:rPr lang="en-US" smtClean="0"/>
+              <a:rPr lang="en-US"/>
               <a:t>Click to edit Master text styles</a:t>
             </a:r>
           </a:p>
           <a:p>
             <a:pPr lvl="1"/>
             <a:r>
-              <a:rPr lang="en-US" smtClean="0"/>
+              <a:rPr lang="en-US"/>
               <a:t>Second level</a:t>
             </a:r>
           </a:p>
           <a:p>
             <a:pPr lvl="2"/>
             <a:r>
-              <a:rPr lang="en-US" smtClean="0"/>
+              <a:rPr lang="en-US"/>
               <a:t>Third level</a:t>
             </a:r>
           </a:p>
           <a:p>
             <a:pPr lvl="3"/>
             <a:r>
-              <a:rPr lang="en-US" smtClean="0"/>
+              <a:rPr lang="en-US"/>
               <a:t>Fourth level</a:t>
             </a:r>
           </a:p>
           <a:p>
             <a:pPr lvl="4"/>
             <a:r>
-              <a:rPr lang="en-US" smtClean="0"/>
+              <a:rPr lang="en-US"/>
               <a:t>Fifth level</a:t>
             </a:r>
-            <a:endParaRPr lang="en-US"/>
           </a:p>
         </p:txBody>
       </p:sp>
@@ -1290,38 +1295,37 @@
           <a:p>
             <a:pPr lvl="0"/>
             <a:r>
-              <a:rPr lang="en-US" smtClean="0"/>
+              <a:rPr lang="en-US"/>
               <a:t>Click to edit Master text styles</a:t>
             </a:r>
           </a:p>
           <a:p>
             <a:pPr lvl="1"/>
             <a:r>
-              <a:rPr lang="en-US" smtClean="0"/>
+              <a:rPr lang="en-US"/>
               <a:t>Second level</a:t>
             </a:r>
           </a:p>
           <a:p>
             <a:pPr lvl="2"/>
             <a:r>
-              <a:rPr lang="en-US" smtClean="0"/>
+              <a:rPr lang="en-US"/>
               <a:t>Third level</a:t>
             </a:r>
           </a:p>
           <a:p>
             <a:pPr lvl="3"/>
             <a:r>
-              <a:rPr lang="en-US" smtClean="0"/>
+              <a:rPr lang="en-US"/>
               <a:t>Fourth level</a:t>
             </a:r>
           </a:p>
           <a:p>
             <a:pPr lvl="4"/>
             <a:r>
-              <a:rPr lang="en-US" smtClean="0"/>
+              <a:rPr lang="en-US"/>
               <a:t>Fifth level</a:t>
             </a:r>
-            <a:endParaRPr lang="en-US"/>
           </a:p>
         </p:txBody>
       </p:sp>
@@ -1342,7 +1346,7 @@
           <a:p>
             <a:fld id="{B01F9CA3-105E-4857-9057-6DB6197DA786}" type="datetimeFigureOut">
               <a:rPr lang="en-US" smtClean="0"/>
-              <a:t>7/31/20</a:t>
+              <a:t>3/15/21</a:t>
             </a:fld>
             <a:endParaRPr lang="en-US"/>
           </a:p>
@@ -1440,10 +1444,9 @@
           </a:lstStyle>
           <a:p>
             <a:r>
-              <a:rPr lang="en-US" smtClean="0"/>
+              <a:rPr lang="en-US"/>
               <a:t>Click to edit Master title style</a:t>
             </a:r>
-            <a:endParaRPr lang="en-US"/>
           </a:p>
         </p:txBody>
       </p:sp>
@@ -1506,7 +1509,7 @@
           <a:p>
             <a:pPr lvl="0"/>
             <a:r>
-              <a:rPr lang="en-US" smtClean="0"/>
+              <a:rPr lang="en-US"/>
               <a:t>Click to edit Master text styles</a:t>
             </a:r>
           </a:p>
@@ -1562,38 +1565,37 @@
           <a:p>
             <a:pPr lvl="0"/>
             <a:r>
-              <a:rPr lang="en-US" smtClean="0"/>
+              <a:rPr lang="en-US"/>
               <a:t>Click to edit Master text styles</a:t>
             </a:r>
           </a:p>
           <a:p>
             <a:pPr lvl="1"/>
             <a:r>
-              <a:rPr lang="en-US" smtClean="0"/>
+              <a:rPr lang="en-US"/>
               <a:t>Second level</a:t>
             </a:r>
           </a:p>
           <a:p>
             <a:pPr lvl="2"/>
             <a:r>
-              <a:rPr lang="en-US" smtClean="0"/>
+              <a:rPr lang="en-US"/>
               <a:t>Third level</a:t>
             </a:r>
           </a:p>
           <a:p>
             <a:pPr lvl="3"/>
             <a:r>
-              <a:rPr lang="en-US" smtClean="0"/>
+              <a:rPr lang="en-US"/>
               <a:t>Fourth level</a:t>
             </a:r>
           </a:p>
           <a:p>
             <a:pPr lvl="4"/>
             <a:r>
-              <a:rPr lang="en-US" smtClean="0"/>
+              <a:rPr lang="en-US"/>
               <a:t>Fifth level</a:t>
             </a:r>
-            <a:endParaRPr lang="en-US"/>
           </a:p>
         </p:txBody>
       </p:sp>
@@ -1656,7 +1658,7 @@
           <a:p>
             <a:pPr lvl="0"/>
             <a:r>
-              <a:rPr lang="en-US" smtClean="0"/>
+              <a:rPr lang="en-US"/>
               <a:t>Click to edit Master text styles</a:t>
             </a:r>
           </a:p>
@@ -1712,38 +1714,37 @@
           <a:p>
             <a:pPr lvl="0"/>
             <a:r>
-              <a:rPr lang="en-US" smtClean="0"/>
+              <a:rPr lang="en-US"/>
               <a:t>Click to edit Master text styles</a:t>
             </a:r>
           </a:p>
           <a:p>
             <a:pPr lvl="1"/>
             <a:r>
-              <a:rPr lang="en-US" smtClean="0"/>
+              <a:rPr lang="en-US"/>
               <a:t>Second level</a:t>
             </a:r>
           </a:p>
           <a:p>
             <a:pPr lvl="2"/>
             <a:r>
-              <a:rPr lang="en-US" smtClean="0"/>
+              <a:rPr lang="en-US"/>
               <a:t>Third level</a:t>
             </a:r>
           </a:p>
           <a:p>
             <a:pPr lvl="3"/>
             <a:r>
-              <a:rPr lang="en-US" smtClean="0"/>
+              <a:rPr lang="en-US"/>
               <a:t>Fourth level</a:t>
             </a:r>
           </a:p>
           <a:p>
             <a:pPr lvl="4"/>
             <a:r>
-              <a:rPr lang="en-US" smtClean="0"/>
+              <a:rPr lang="en-US"/>
               <a:t>Fifth level</a:t>
             </a:r>
-            <a:endParaRPr lang="en-US"/>
           </a:p>
         </p:txBody>
       </p:sp>
@@ -1764,7 +1765,7 @@
           <a:p>
             <a:fld id="{B01F9CA3-105E-4857-9057-6DB6197DA786}" type="datetimeFigureOut">
               <a:rPr lang="en-US" smtClean="0"/>
-              <a:t>7/31/20</a:t>
+              <a:t>3/15/21</a:t>
             </a:fld>
             <a:endParaRPr lang="en-US"/>
           </a:p>
@@ -1858,10 +1859,9 @@
           <a:lstStyle/>
           <a:p>
             <a:r>
-              <a:rPr lang="en-US" smtClean="0"/>
+              <a:rPr lang="en-US"/>
               <a:t>Click to edit Master title style</a:t>
             </a:r>
-            <a:endParaRPr lang="en-US"/>
           </a:p>
         </p:txBody>
       </p:sp>
@@ -1882,7 +1882,7 @@
           <a:p>
             <a:fld id="{B01F9CA3-105E-4857-9057-6DB6197DA786}" type="datetimeFigureOut">
               <a:rPr lang="en-US" smtClean="0"/>
-              <a:t>7/31/20</a:t>
+              <a:t>3/15/21</a:t>
             </a:fld>
             <a:endParaRPr lang="en-US"/>
           </a:p>
@@ -1977,7 +1977,7 @@
           <a:p>
             <a:fld id="{B01F9CA3-105E-4857-9057-6DB6197DA786}" type="datetimeFigureOut">
               <a:rPr lang="en-US" smtClean="0"/>
-              <a:t>7/31/20</a:t>
+              <a:t>3/15/21</a:t>
             </a:fld>
             <a:endParaRPr lang="en-US"/>
           </a:p>
@@ -2080,10 +2080,9 @@
           </a:lstStyle>
           <a:p>
             <a:r>
-              <a:rPr lang="en-US" smtClean="0"/>
+              <a:rPr lang="en-US"/>
               <a:t>Click to edit Master title style</a:t>
             </a:r>
-            <a:endParaRPr lang="en-US"/>
           </a:p>
         </p:txBody>
       </p:sp>
@@ -2137,38 +2136,37 @@
           <a:p>
             <a:pPr lvl="0"/>
             <a:r>
-              <a:rPr lang="en-US" smtClean="0"/>
+              <a:rPr lang="en-US"/>
               <a:t>Click to edit Master text styles</a:t>
             </a:r>
           </a:p>
           <a:p>
             <a:pPr lvl="1"/>
             <a:r>
-              <a:rPr lang="en-US" smtClean="0"/>
+              <a:rPr lang="en-US"/>
               <a:t>Second level</a:t>
             </a:r>
           </a:p>
           <a:p>
             <a:pPr lvl="2"/>
             <a:r>
-              <a:rPr lang="en-US" smtClean="0"/>
+              <a:rPr lang="en-US"/>
               <a:t>Third level</a:t>
             </a:r>
           </a:p>
           <a:p>
             <a:pPr lvl="3"/>
             <a:r>
-              <a:rPr lang="en-US" smtClean="0"/>
+              <a:rPr lang="en-US"/>
               <a:t>Fourth level</a:t>
             </a:r>
           </a:p>
           <a:p>
             <a:pPr lvl="4"/>
             <a:r>
-              <a:rPr lang="en-US" smtClean="0"/>
+              <a:rPr lang="en-US"/>
               <a:t>Fifth level</a:t>
             </a:r>
-            <a:endParaRPr lang="en-US"/>
           </a:p>
         </p:txBody>
       </p:sp>
@@ -2231,7 +2229,7 @@
           <a:p>
             <a:pPr lvl="0"/>
             <a:r>
-              <a:rPr lang="en-US" smtClean="0"/>
+              <a:rPr lang="en-US"/>
               <a:t>Click to edit Master text styles</a:t>
             </a:r>
           </a:p>
@@ -2254,7 +2252,7 @@
           <a:p>
             <a:fld id="{B01F9CA3-105E-4857-9057-6DB6197DA786}" type="datetimeFigureOut">
               <a:rPr lang="en-US" smtClean="0"/>
-              <a:t>7/31/20</a:t>
+              <a:t>3/15/21</a:t>
             </a:fld>
             <a:endParaRPr lang="en-US"/>
           </a:p>
@@ -2357,10 +2355,9 @@
           </a:lstStyle>
           <a:p>
             <a:r>
-              <a:rPr lang="en-US" smtClean="0"/>
+              <a:rPr lang="en-US"/>
               <a:t>Click to edit Master title style</a:t>
             </a:r>
-            <a:endParaRPr lang="en-US"/>
           </a:p>
         </p:txBody>
       </p:sp>
@@ -2484,7 +2481,7 @@
           <a:p>
             <a:pPr lvl="0"/>
             <a:r>
-              <a:rPr lang="en-US" smtClean="0"/>
+              <a:rPr lang="en-US"/>
               <a:t>Click to edit Master text styles</a:t>
             </a:r>
           </a:p>
@@ -2507,7 +2504,7 @@
           <a:p>
             <a:fld id="{B01F9CA3-105E-4857-9057-6DB6197DA786}" type="datetimeFigureOut">
               <a:rPr lang="en-US" smtClean="0"/>
-              <a:t>7/31/20</a:t>
+              <a:t>3/15/21</a:t>
             </a:fld>
             <a:endParaRPr lang="en-US"/>
           </a:p>
@@ -2616,10 +2613,9 @@
           <a:lstStyle/>
           <a:p>
             <a:r>
-              <a:rPr lang="en-US" smtClean="0"/>
+              <a:rPr lang="en-US"/>
               <a:t>Click to edit Master title style</a:t>
             </a:r>
-            <a:endParaRPr lang="en-US"/>
           </a:p>
         </p:txBody>
       </p:sp>
@@ -2650,38 +2646,37 @@
           <a:p>
             <a:pPr lvl="0"/>
             <a:r>
-              <a:rPr lang="en-US" smtClean="0"/>
+              <a:rPr lang="en-US"/>
               <a:t>Click to edit Master text styles</a:t>
             </a:r>
           </a:p>
           <a:p>
             <a:pPr lvl="1"/>
             <a:r>
-              <a:rPr lang="en-US" smtClean="0"/>
+              <a:rPr lang="en-US"/>
               <a:t>Second level</a:t>
             </a:r>
           </a:p>
           <a:p>
             <a:pPr lvl="2"/>
             <a:r>
-              <a:rPr lang="en-US" smtClean="0"/>
+              <a:rPr lang="en-US"/>
               <a:t>Third level</a:t>
             </a:r>
           </a:p>
           <a:p>
             <a:pPr lvl="3"/>
             <a:r>
-              <a:rPr lang="en-US" smtClean="0"/>
+              <a:rPr lang="en-US"/>
               <a:t>Fourth level</a:t>
             </a:r>
           </a:p>
           <a:p>
             <a:pPr lvl="4"/>
             <a:r>
-              <a:rPr lang="en-US" smtClean="0"/>
+              <a:rPr lang="en-US"/>
               <a:t>Fifth level</a:t>
             </a:r>
-            <a:endParaRPr lang="en-US"/>
           </a:p>
         </p:txBody>
       </p:sp>
@@ -2720,7 +2715,7 @@
           <a:p>
             <a:fld id="{B01F9CA3-105E-4857-9057-6DB6197DA786}" type="datetimeFigureOut">
               <a:rPr lang="en-US" smtClean="0"/>
-              <a:t>7/31/20</a:t>
+              <a:t>3/15/21</a:t>
             </a:fld>
             <a:endParaRPr lang="en-US"/>
           </a:p>
@@ -3141,7 +3136,7 @@
           <a:lstStyle/>
           <a:p>
             <a:r>
-              <a:rPr lang="en-US" sz="1200" dirty="0" err="1" smtClean="0">
+              <a:rPr lang="en-US" sz="1200" dirty="0" err="1">
                 <a:solidFill>
                   <a:schemeClr val="tx1"/>
                 </a:solidFill>
@@ -3206,14 +3201,14 @@
           <a:lstStyle/>
           <a:p>
             <a:r>
-              <a:rPr lang="en-US" sz="1200" dirty="0" err="1" smtClean="0">
+              <a:rPr lang="en-US" sz="1200" dirty="0" err="1">
                 <a:solidFill>
                   <a:schemeClr val="tx1"/>
                 </a:solidFill>
                 <a:latin typeface="Courier"/>
                 <a:cs typeface="Courier"/>
               </a:rPr>
-              <a:t>self.canvas</a:t>
+              <a:t>self.canvasFrame</a:t>
             </a:r>
             <a:endParaRPr lang="en-US" sz="1200" dirty="0">
               <a:solidFill>
@@ -3271,7 +3266,7 @@
           <a:lstStyle/>
           <a:p>
             <a:r>
-              <a:rPr lang="en-US" sz="1200" dirty="0" err="1" smtClean="0">
+              <a:rPr lang="en-US" sz="1200" dirty="0" err="1">
                 <a:solidFill>
                   <a:schemeClr val="tx1"/>
                 </a:solidFill>
@@ -3336,7 +3331,7 @@
           <a:lstStyle/>
           <a:p>
             <a:r>
-              <a:rPr lang="en-US" sz="1200" dirty="0" err="1" smtClean="0">
+              <a:rPr lang="en-US" sz="1200" dirty="0" err="1">
                 <a:solidFill>
                   <a:schemeClr val="tx1"/>
                 </a:solidFill>
@@ -3346,7 +3341,7 @@
               <a:t>self.operationsUpper</a:t>
             </a:r>
             <a:r>
-              <a:rPr lang="en-US" sz="1200" dirty="0" smtClean="0">
+              <a:rPr lang="en-US" sz="1200" dirty="0">
                 <a:solidFill>
                   <a:schemeClr val="tx1"/>
                 </a:solidFill>
@@ -3356,7 +3351,7 @@
               <a:t>  </a:t>
             </a:r>
             <a:r>
-              <a:rPr lang="en-US" sz="1200" dirty="0" smtClean="0">
+              <a:rPr lang="en-US" sz="1200" dirty="0">
                 <a:solidFill>
                   <a:schemeClr val="tx1"/>
                 </a:solidFill>
@@ -3364,12 +3359,6 @@
               </a:rPr>
               <a:t>----- Operations ------</a:t>
             </a:r>
-            <a:endParaRPr lang="en-US" sz="1200" dirty="0">
-              <a:solidFill>
-                <a:schemeClr val="tx1"/>
-              </a:solidFill>
-              <a:cs typeface="Courier"/>
-            </a:endParaRPr>
           </a:p>
         </p:txBody>
       </p:sp>
@@ -3419,7 +3408,7 @@
           <a:lstStyle/>
           <a:p>
             <a:r>
-              <a:rPr lang="en-US" sz="1200" smtClean="0">
+              <a:rPr lang="en-US" sz="1200">
                 <a:solidFill>
                   <a:schemeClr val="tx1"/>
                 </a:solidFill>
@@ -3484,7 +3473,7 @@
           <a:lstStyle/>
           <a:p>
             <a:r>
-              <a:rPr lang="en-US" sz="1200" dirty="0" err="1" smtClean="0">
+              <a:rPr lang="en-US" sz="1200" dirty="0" err="1">
                 <a:solidFill>
                   <a:schemeClr val="tx1"/>
                 </a:solidFill>
@@ -3549,7 +3538,7 @@
           <a:lstStyle/>
           <a:p>
             <a:r>
-              <a:rPr lang="en-US" sz="1200" dirty="0" err="1" smtClean="0">
+              <a:rPr lang="en-US" sz="1200" dirty="0" err="1">
                 <a:solidFill>
                   <a:schemeClr val="tx1"/>
                 </a:solidFill>
@@ -3612,7 +3601,7 @@
           <a:lstStyle/>
           <a:p>
             <a:r>
-              <a:rPr lang="en-US" sz="1200" dirty="0" err="1" smtClean="0">
+              <a:rPr lang="en-US" sz="1200" dirty="0" err="1">
                 <a:solidFill>
                   <a:schemeClr val="tx1"/>
                 </a:solidFill>
@@ -3673,7 +3662,7 @@
           <a:lstStyle/>
           <a:p>
             <a:r>
-              <a:rPr lang="en-US" sz="1200" dirty="0" err="1" smtClean="0">
+              <a:rPr lang="en-US" sz="1200" dirty="0" err="1">
                 <a:solidFill>
                   <a:schemeClr val="tx1"/>
                 </a:solidFill>
@@ -3735,7 +3724,7 @@
           <a:p>
             <a:pPr algn="ctr"/>
             <a:r>
-              <a:rPr lang="en-US" sz="1200" dirty="0" err="1" smtClean="0">
+              <a:rPr lang="en-US" sz="1200" dirty="0" err="1">
                 <a:solidFill>
                   <a:schemeClr val="tx1"/>
                 </a:solidFill>
@@ -3776,18 +3765,13 @@
           <a:lstStyle/>
           <a:p>
             <a:r>
-              <a:rPr lang="en-US" sz="1200" dirty="0" smtClean="0">
+              <a:rPr lang="en-US" sz="1200" dirty="0">
                 <a:solidFill>
                   <a:srgbClr val="0000FF"/>
                 </a:solidFill>
               </a:rPr>
               <a:t>Animation Speed: slow</a:t>
             </a:r>
-            <a:endParaRPr lang="en-US" sz="1200" dirty="0">
-              <a:solidFill>
-                <a:srgbClr val="0000FF"/>
-              </a:solidFill>
-            </a:endParaRPr>
           </a:p>
         </p:txBody>
       </p:sp>
@@ -3814,7 +3798,7 @@
           <a:lstStyle/>
           <a:p>
             <a:r>
-              <a:rPr lang="en-US" sz="1200" dirty="0" smtClean="0">
+              <a:rPr lang="en-US" sz="1200" dirty="0">
                 <a:solidFill>
                   <a:srgbClr val="0000FF"/>
                 </a:solidFill>
@@ -3847,7 +3831,7 @@
           <a:lstStyle/>
           <a:p>
             <a:r>
-              <a:rPr lang="en-US" sz="1200" dirty="0" smtClean="0">
+              <a:rPr lang="en-US" sz="1200" dirty="0">
                 <a:solidFill>
                   <a:srgbClr val="0000FF"/>
                 </a:solidFill>
@@ -3904,7 +3888,7 @@
           <a:lstStyle/>
           <a:p>
             <a:r>
-              <a:rPr lang="en-US" sz="1200" dirty="0" err="1" smtClean="0">
+              <a:rPr lang="en-US" sz="1200" dirty="0" err="1">
                 <a:solidFill>
                   <a:schemeClr val="tx1"/>
                 </a:solidFill>
@@ -3968,14 +3952,14 @@
           <a:lstStyle/>
           <a:p>
             <a:r>
-              <a:rPr lang="en-US" sz="1200" dirty="0" err="1" smtClean="0">
+              <a:rPr lang="en-US" sz="1200" dirty="0" err="1">
                 <a:solidFill>
                   <a:schemeClr val="tx1"/>
                 </a:solidFill>
                 <a:latin typeface="Courier"/>
                 <a:cs typeface="Courier"/>
               </a:rPr>
-              <a:t>self.HScroll</a:t>
+              <a:t>self.codeHScroll</a:t>
             </a:r>
             <a:endParaRPr lang="en-US" sz="1200" dirty="0">
               <a:solidFill>
@@ -4032,19 +4016,232 @@
           <a:lstStyle/>
           <a:p>
             <a:r>
-              <a:rPr lang="en-US" sz="1200" dirty="0" err="1" smtClean="0">
+              <a:rPr lang="en-US" sz="1200" dirty="0" err="1">
                 <a:solidFill>
                   <a:schemeClr val="tx1"/>
                 </a:solidFill>
                 <a:latin typeface="Courier"/>
                 <a:cs typeface="Courier"/>
               </a:rPr>
-              <a:t>self.VScroll</a:t>
+              <a:t>self.codeVScroll</a:t>
             </a:r>
             <a:endParaRPr lang="en-US" sz="1200" dirty="0">
               <a:solidFill>
                 <a:schemeClr val="tx1"/>
               </a:solidFill>
+              <a:cs typeface="Courier"/>
+            </a:endParaRPr>
+          </a:p>
+        </p:txBody>
+      </p:sp>
+      <p:sp>
+        <p:nvSpPr>
+          <p:cNvPr id="18" name="Rectangle 17">
+            <a:extLst>
+              <a:ext uri="{FF2B5EF4-FFF2-40B4-BE49-F238E27FC236}">
+                <a16:creationId xmlns:a16="http://schemas.microsoft.com/office/drawing/2014/main" id="{B07386E1-5B37-874E-A46D-9C8DA3BC7D69}"/>
+              </a:ext>
+            </a:extLst>
+          </p:cNvPr>
+          <p:cNvSpPr/>
+          <p:nvPr/>
+        </p:nvSpPr>
+        <p:spPr>
+          <a:xfrm>
+            <a:off x="780400" y="832356"/>
+            <a:ext cx="7396314" cy="2931815"/>
+          </a:xfrm>
+          <a:prstGeom prst="rect">
+            <a:avLst/>
+          </a:prstGeom>
+          <a:solidFill>
+            <a:schemeClr val="accent5">
+              <a:lumMod val="40000"/>
+              <a:lumOff val="60000"/>
+            </a:schemeClr>
+          </a:solidFill>
+          <a:ln>
+            <a:solidFill>
+              <a:schemeClr val="tx1"/>
+            </a:solidFill>
+          </a:ln>
+          <a:effectLst/>
+        </p:spPr>
+        <p:style>
+          <a:lnRef idx="1">
+            <a:schemeClr val="accent1"/>
+          </a:lnRef>
+          <a:fillRef idx="3">
+            <a:schemeClr val="accent1"/>
+          </a:fillRef>
+          <a:effectRef idx="2">
+            <a:schemeClr val="accent1"/>
+          </a:effectRef>
+          <a:fontRef idx="minor">
+            <a:schemeClr val="lt1"/>
+          </a:fontRef>
+        </p:style>
+        <p:txBody>
+          <a:bodyPr lIns="0" tIns="0" rIns="0" bIns="0" rtlCol="0" anchor="t" anchorCtr="0"/>
+          <a:lstStyle/>
+          <a:p>
+            <a:r>
+              <a:rPr lang="en-US" sz="1200" dirty="0" err="1">
+                <a:solidFill>
+                  <a:schemeClr val="tx1"/>
+                </a:solidFill>
+                <a:latin typeface="Courier"/>
+                <a:cs typeface="Courier"/>
+              </a:rPr>
+              <a:t>self.canvas</a:t>
+            </a:r>
+            <a:endParaRPr lang="en-US" sz="1200" dirty="0">
+              <a:solidFill>
+                <a:schemeClr val="tx1"/>
+              </a:solidFill>
+              <a:latin typeface="Courier"/>
+              <a:cs typeface="Courier"/>
+            </a:endParaRPr>
+          </a:p>
+        </p:txBody>
+      </p:sp>
+      <p:sp>
+        <p:nvSpPr>
+          <p:cNvPr id="19" name="Rectangle 18">
+            <a:extLst>
+              <a:ext uri="{FF2B5EF4-FFF2-40B4-BE49-F238E27FC236}">
+                <a16:creationId xmlns:a16="http://schemas.microsoft.com/office/drawing/2014/main" id="{7AFE4000-CB72-2C43-A7B0-666B51B1997F}"/>
+              </a:ext>
+            </a:extLst>
+          </p:cNvPr>
+          <p:cNvSpPr/>
+          <p:nvPr/>
+        </p:nvSpPr>
+        <p:spPr>
+          <a:xfrm>
+            <a:off x="780400" y="3744102"/>
+            <a:ext cx="7396314" cy="187569"/>
+          </a:xfrm>
+          <a:prstGeom prst="rect">
+            <a:avLst/>
+          </a:prstGeom>
+          <a:solidFill>
+            <a:schemeClr val="accent5">
+              <a:lumMod val="60000"/>
+              <a:lumOff val="40000"/>
+            </a:schemeClr>
+          </a:solidFill>
+          <a:ln>
+            <a:solidFill>
+              <a:schemeClr val="tx1"/>
+            </a:solidFill>
+          </a:ln>
+          <a:effectLst/>
+        </p:spPr>
+        <p:style>
+          <a:lnRef idx="1">
+            <a:schemeClr val="accent1"/>
+          </a:lnRef>
+          <a:fillRef idx="3">
+            <a:schemeClr val="accent1"/>
+          </a:fillRef>
+          <a:effectRef idx="2">
+            <a:schemeClr val="accent1"/>
+          </a:effectRef>
+          <a:fontRef idx="minor">
+            <a:schemeClr val="lt1"/>
+          </a:fontRef>
+        </p:style>
+        <p:txBody>
+          <a:bodyPr lIns="0" tIns="0" rIns="0" bIns="0" rtlCol="0" anchor="t" anchorCtr="0"/>
+          <a:lstStyle/>
+          <a:p>
+            <a:r>
+              <a:rPr lang="en-US" sz="1200" dirty="0" err="1">
+                <a:solidFill>
+                  <a:schemeClr val="tx1"/>
+                </a:solidFill>
+                <a:latin typeface="Courier"/>
+                <a:cs typeface="Courier"/>
+              </a:rPr>
+              <a:t>self.canvasHScroll</a:t>
+            </a:r>
+            <a:endParaRPr lang="en-US" sz="1200" dirty="0">
+              <a:solidFill>
+                <a:schemeClr val="tx1"/>
+              </a:solidFill>
+              <a:latin typeface="Courier"/>
+              <a:cs typeface="Courier"/>
+            </a:endParaRPr>
+          </a:p>
+        </p:txBody>
+      </p:sp>
+      <p:sp>
+        <p:nvSpPr>
+          <p:cNvPr id="20" name="Rectangle 19">
+            <a:extLst>
+              <a:ext uri="{FF2B5EF4-FFF2-40B4-BE49-F238E27FC236}">
+                <a16:creationId xmlns:a16="http://schemas.microsoft.com/office/drawing/2014/main" id="{79665F03-FC04-7D42-BF71-CDC2A10AB2CB}"/>
+              </a:ext>
+            </a:extLst>
+          </p:cNvPr>
+          <p:cNvSpPr/>
+          <p:nvPr/>
+        </p:nvSpPr>
+        <p:spPr>
+          <a:xfrm rot="5400000">
+            <a:off x="6702736" y="2306336"/>
+            <a:ext cx="3099315" cy="151360"/>
+          </a:xfrm>
+          <a:prstGeom prst="rect">
+            <a:avLst/>
+          </a:prstGeom>
+          <a:solidFill>
+            <a:schemeClr val="accent5">
+              <a:lumMod val="60000"/>
+              <a:lumOff val="40000"/>
+            </a:schemeClr>
+          </a:solidFill>
+          <a:ln>
+            <a:solidFill>
+              <a:schemeClr val="tx1"/>
+            </a:solidFill>
+          </a:ln>
+          <a:effectLst/>
+        </p:spPr>
+        <p:style>
+          <a:lnRef idx="1">
+            <a:schemeClr val="accent1"/>
+          </a:lnRef>
+          <a:fillRef idx="3">
+            <a:schemeClr val="accent1"/>
+          </a:fillRef>
+          <a:effectRef idx="2">
+            <a:schemeClr val="accent1"/>
+          </a:effectRef>
+          <a:fontRef idx="minor">
+            <a:schemeClr val="lt1"/>
+          </a:fontRef>
+        </p:style>
+        <p:txBody>
+          <a:bodyPr lIns="0" tIns="0" rIns="0" bIns="0" rtlCol="0" anchor="t" anchorCtr="0"/>
+          <a:lstStyle/>
+          <a:p>
+            <a:r>
+              <a:rPr lang="en-US" sz="1200" dirty="0" err="1">
+                <a:solidFill>
+                  <a:schemeClr val="tx1"/>
+                </a:solidFill>
+                <a:latin typeface="Courier"/>
+                <a:cs typeface="Courier"/>
+              </a:rPr>
+              <a:t>self.canvasVScroll</a:t>
+            </a:r>
+            <a:endParaRPr lang="en-US" sz="1200" dirty="0">
+              <a:solidFill>
+                <a:schemeClr val="tx1"/>
+              </a:solidFill>
+              <a:latin typeface="Courier"/>
               <a:cs typeface="Courier"/>
             </a:endParaRPr>
           </a:p>

</xml_diff>